<commit_message>
Add more source to slides
</commit_message>
<xml_diff>
--- a/slides.pptx
+++ b/slides.pptx
@@ -114,7 +114,7 @@
         <p:txBody>
           <a:bodyPr/>
           <a:p>
-            <a:fld id="{C8E464C2-3B99-4242-985A-53E22B356795}" type="slidenum">
+            <a:fld id="{BB727B84-B446-4A78-B610-CF620C7C8CC8}" type="slidenum">
               <a:t>&lt;#&gt;</a:t>
             </a:fld>
           </a:p>
@@ -197,7 +197,7 @@
         <p:txBody>
           <a:bodyPr/>
           <a:p>
-            <a:fld id="{726BBBAA-DEEF-46B4-8F1C-6D8852EEC403}" type="slidenum">
+            <a:fld id="{5CDC36FC-0C46-4457-8F12-D4765C5FCDB9}" type="slidenum">
               <a:t>&lt;#&gt;</a:t>
             </a:fld>
           </a:p>
@@ -280,7 +280,7 @@
         <p:txBody>
           <a:bodyPr/>
           <a:p>
-            <a:fld id="{0A257CCF-4381-4FD2-91C6-1C198AA1B269}" type="slidenum">
+            <a:fld id="{0210EB78-CC13-4B6F-AA2F-D6DC9576188E}" type="slidenum">
               <a:t>&lt;#&gt;</a:t>
             </a:fld>
           </a:p>
@@ -363,7 +363,7 @@
         <p:txBody>
           <a:bodyPr/>
           <a:p>
-            <a:fld id="{CCCFC0D7-4162-487E-80DD-5903C297639A}" type="slidenum">
+            <a:fld id="{592E4D13-4B5D-49B6-AAB9-803E99D3908C}" type="slidenum">
               <a:t>&lt;#&gt;</a:t>
             </a:fld>
           </a:p>
@@ -446,7 +446,7 @@
         <p:txBody>
           <a:bodyPr/>
           <a:p>
-            <a:fld id="{C872808B-FD05-44FC-8951-C3921CF89135}" type="slidenum">
+            <a:fld id="{AB1090FF-222B-4008-94A6-C46DC74D4782}" type="slidenum">
               <a:t>&lt;#&gt;</a:t>
             </a:fld>
           </a:p>
@@ -529,7 +529,7 @@
         <p:txBody>
           <a:bodyPr/>
           <a:p>
-            <a:fld id="{82991FF7-316F-43B0-9140-87CCA8148A64}" type="slidenum">
+            <a:fld id="{74A0E222-9F16-4A8A-ACA5-E0D49B7B7278}" type="slidenum">
               <a:t>&lt;#&gt;</a:t>
             </a:fld>
           </a:p>
@@ -612,7 +612,7 @@
         <p:txBody>
           <a:bodyPr/>
           <a:p>
-            <a:fld id="{3669FE38-35E2-43A1-8EBD-0BA53E436151}" type="slidenum">
+            <a:fld id="{A410B899-25D3-4676-9618-DC79E51A930A}" type="slidenum">
               <a:t>&lt;#&gt;</a:t>
             </a:fld>
           </a:p>
@@ -695,7 +695,7 @@
         <p:txBody>
           <a:bodyPr/>
           <a:p>
-            <a:fld id="{BCF79871-0BE1-4C1B-8F2F-CEFBCCE9F2A0}" type="slidenum">
+            <a:fld id="{4483342F-52DF-48AD-87DA-05AC8641FC8F}" type="slidenum">
               <a:t>&lt;#&gt;</a:t>
             </a:fld>
           </a:p>
@@ -822,7 +822,7 @@
         <p:txBody>
           <a:bodyPr/>
           <a:p>
-            <a:fld id="{2959EE9F-6FB5-47AF-9AF2-E757FA25CD58}" type="slidenum">
+            <a:fld id="{5C27994B-2DA8-4CD2-9608-DA717936FA58}" type="slidenum">
               <a:t>&lt;#&gt;</a:t>
             </a:fld>
           </a:p>
@@ -905,7 +905,7 @@
         <p:txBody>
           <a:bodyPr/>
           <a:p>
-            <a:fld id="{A1074317-2C4D-4F7F-B86E-47EE62496641}" type="slidenum">
+            <a:fld id="{06DEB7A9-4E21-4EEA-A445-CD6C8EF6EDE4}" type="slidenum">
               <a:t>&lt;#&gt;</a:t>
             </a:fld>
           </a:p>
@@ -1468,7 +1468,7 @@
               </a:lnSpc>
               <a:buNone/>
             </a:pPr>
-            <a:fld id="{17509037-7A76-4AA2-95C3-E9ABF70E6A4B}" type="slidenum">
+            <a:fld id="{78008EF7-9AD8-4E66-BEB5-3839F7478A97}" type="slidenum">
               <a:rPr b="1" lang="en-US" sz="1200" spc="-1" strike="noStrike">
                 <a:solidFill>
                   <a:srgbClr val="c00000"/>
@@ -1935,7 +1935,7 @@
               </a:lnSpc>
               <a:buNone/>
             </a:pPr>
-            <a:fld id="{603BF365-6D2E-4E5A-8709-9EBEC287410C}" type="slidenum">
+            <a:fld id="{A6DDD0A3-169A-42B0-8FDD-36F4F828A02C}" type="slidenum">
               <a:rPr b="1" lang="en-US" sz="1200" spc="-1" strike="noStrike">
                 <a:solidFill>
                   <a:srgbClr val="c00000"/>
@@ -2827,7 +2827,7 @@
               </a:lnSpc>
               <a:buNone/>
             </a:pPr>
-            <a:fld id="{10E23E94-FBA9-4547-BB56-80CAC06F4EF9}" type="slidenum">
+            <a:fld id="{7533E9D8-8BF9-46E8-BD5A-49E9802E7D26}" type="slidenum">
               <a:rPr b="1" lang="en-US" sz="1200" spc="-1" strike="noStrike">
                 <a:solidFill>
                   <a:srgbClr val="c00000"/>
@@ -3484,7 +3484,7 @@
               </a:lnSpc>
               <a:buNone/>
             </a:pPr>
-            <a:fld id="{117A4DFF-096E-4F0B-AC0A-C356BBB60E5D}" type="slidenum">
+            <a:fld id="{70CB813F-DC98-4D37-A2CA-7E04DB6C6476}" type="slidenum">
               <a:rPr b="1" lang="en-US" sz="1200" spc="-1" strike="noStrike">
                 <a:solidFill>
                   <a:schemeClr val="accent1">
@@ -3716,7 +3716,7 @@
               </a:lnSpc>
               <a:buNone/>
             </a:pPr>
-            <a:fld id="{0BA91D12-0BE3-4BF2-8924-8B911F7C17F2}" type="slidenum">
+            <a:fld id="{B44B97EB-1E5C-47DD-85CB-F24FD0B2BBB3}" type="slidenum">
               <a:rPr b="1" lang="en-US" sz="1200" spc="-1" strike="noStrike">
                 <a:solidFill>
                   <a:srgbClr val="c00000"/>
@@ -4108,17 +4108,7 @@
                 <a:latin typeface="Lato"/>
                 <a:ea typeface="Lato"/>
               </a:rPr>
-              <a:t>Click to edit Master </a:t>
-            </a:r>
-            <a:r>
-              <a:rPr b="0" lang="en-US" sz="2800" spc="-1" strike="noStrike">
-                <a:solidFill>
-                  <a:schemeClr val="dk1"/>
-                </a:solidFill>
-                <a:latin typeface="Lato"/>
-                <a:ea typeface="Lato"/>
-              </a:rPr>
-              <a:t>text styles</a:t>
+              <a:t>Click to edit Master text styles</a:t>
             </a:r>
             <a:endParaRPr b="0" lang="en-US" sz="2800" spc="-1" strike="noStrike">
               <a:solidFill>
@@ -4614,7 +4604,7 @@
               </a:lnSpc>
               <a:buNone/>
             </a:pPr>
-            <a:fld id="{231A2BC8-7405-4259-B521-139857AB1F3E}" type="slidenum">
+            <a:fld id="{478E2128-2EF8-4B9D-8365-CB67CEC7ECC1}" type="slidenum">
               <a:rPr b="1" lang="en-US" sz="1200" spc="-1" strike="noStrike">
                 <a:solidFill>
                   <a:srgbClr val="c00000"/>
@@ -4844,7 +4834,7 @@
               </a:lnSpc>
               <a:buNone/>
             </a:pPr>
-            <a:fld id="{94A4B476-64C6-4BFE-B4B9-AE1BBC332221}" type="slidenum">
+            <a:fld id="{7AB9489B-3722-4E0C-8343-1AACA1CA0290}" type="slidenum">
               <a:rPr b="1" lang="en-US" sz="1200" spc="-1" strike="noStrike">
                 <a:solidFill>
                   <a:srgbClr val="c00000"/>
@@ -5315,7 +5305,7 @@
               </a:lnSpc>
               <a:buNone/>
             </a:pPr>
-            <a:fld id="{72025EE1-B35A-4F7B-BC93-EAD3FF0E35CD}" type="slidenum">
+            <a:fld id="{28FB689D-0BFA-4D5E-AD91-4242A8191784}" type="slidenum">
               <a:rPr b="1" lang="en-US" sz="1200" spc="-1" strike="noStrike">
                 <a:solidFill>
                   <a:srgbClr val="c00000"/>
@@ -5705,7 +5695,107 @@
                 <a:latin typeface="Lato"/>
                 <a:ea typeface="Lato"/>
               </a:rPr>
-              <a:t>CLICK TO EDIT MASTER TITLE STYLE</a:t>
+              <a:t>CLI</a:t>
+            </a:r>
+            <a:r>
+              <a:rPr b="1" lang="en-US" sz="4800" spc="-1" strike="noStrike">
+                <a:solidFill>
+                  <a:schemeClr val="lt1"/>
+                </a:solidFill>
+                <a:latin typeface="Lato"/>
+                <a:ea typeface="Lato"/>
+              </a:rPr>
+              <a:t>CK </a:t>
+            </a:r>
+            <a:r>
+              <a:rPr b="1" lang="en-US" sz="4800" spc="-1" strike="noStrike">
+                <a:solidFill>
+                  <a:schemeClr val="lt1"/>
+                </a:solidFill>
+                <a:latin typeface="Lato"/>
+                <a:ea typeface="Lato"/>
+              </a:rPr>
+              <a:t>TO </a:t>
+            </a:r>
+            <a:r>
+              <a:rPr b="1" lang="en-US" sz="4800" spc="-1" strike="noStrike">
+                <a:solidFill>
+                  <a:schemeClr val="lt1"/>
+                </a:solidFill>
+                <a:latin typeface="Lato"/>
+                <a:ea typeface="Lato"/>
+              </a:rPr>
+              <a:t>EDI</a:t>
+            </a:r>
+            <a:r>
+              <a:rPr b="1" lang="en-US" sz="4800" spc="-1" strike="noStrike">
+                <a:solidFill>
+                  <a:schemeClr val="lt1"/>
+                </a:solidFill>
+                <a:latin typeface="Lato"/>
+                <a:ea typeface="Lato"/>
+              </a:rPr>
+              <a:t>T </a:t>
+            </a:r>
+            <a:r>
+              <a:rPr b="1" lang="en-US" sz="4800" spc="-1" strike="noStrike">
+                <a:solidFill>
+                  <a:schemeClr val="lt1"/>
+                </a:solidFill>
+                <a:latin typeface="Lato"/>
+                <a:ea typeface="Lato"/>
+              </a:rPr>
+              <a:t>MAS</a:t>
+            </a:r>
+            <a:r>
+              <a:rPr b="1" lang="en-US" sz="4800" spc="-1" strike="noStrike">
+                <a:solidFill>
+                  <a:schemeClr val="lt1"/>
+                </a:solidFill>
+                <a:latin typeface="Lato"/>
+                <a:ea typeface="Lato"/>
+              </a:rPr>
+              <a:t>TER </a:t>
+            </a:r>
+            <a:r>
+              <a:rPr b="1" lang="en-US" sz="4800" spc="-1" strike="noStrike">
+                <a:solidFill>
+                  <a:schemeClr val="lt1"/>
+                </a:solidFill>
+                <a:latin typeface="Lato"/>
+                <a:ea typeface="Lato"/>
+              </a:rPr>
+              <a:t>TITL</a:t>
+            </a:r>
+            <a:r>
+              <a:rPr b="1" lang="en-US" sz="4800" spc="-1" strike="noStrike">
+                <a:solidFill>
+                  <a:schemeClr val="lt1"/>
+                </a:solidFill>
+                <a:latin typeface="Lato"/>
+                <a:ea typeface="Lato"/>
+              </a:rPr>
+              <a:t>E </a:t>
+            </a:r>
+            <a:r>
+              <a:rPr b="1" lang="en-US" sz="4800" spc="-1" strike="noStrike">
+                <a:solidFill>
+                  <a:schemeClr val="lt1"/>
+                </a:solidFill>
+                <a:latin typeface="Lato"/>
+                <a:ea typeface="Lato"/>
+              </a:rPr>
+              <a:t>STY</a:t>
+            </a:r>
+            <a:r>
+              <a:rPr b="1" lang="en-US" sz="4800" spc="-1" strike="noStrike">
+                <a:solidFill>
+                  <a:schemeClr val="lt1"/>
+                </a:solidFill>
+                <a:latin typeface="Lato"/>
+                <a:ea typeface="Lato"/>
+              </a:rPr>
+              <a:t>LE</a:t>
             </a:r>
             <a:endParaRPr b="0" lang="en-US" sz="4800" spc="-1" strike="noStrike">
               <a:solidFill>
@@ -6502,7 +6592,7 @@
               </a:lnSpc>
               <a:buNone/>
             </a:pPr>
-            <a:fld id="{979CDF35-1D43-494C-B07A-A49D7EEE8BBB}" type="slidenum">
+            <a:fld id="{748D42F8-AE78-458F-935F-80E0526B8976}" type="slidenum">
               <a:rPr b="1" lang="en-US" sz="1200" spc="-1" strike="noStrike">
                 <a:solidFill>
                   <a:srgbClr val="c00000"/>
@@ -6623,7 +6713,17 @@
                 <a:latin typeface="Lato"/>
                 <a:ea typeface="Lato"/>
               </a:rPr>
-              <a:t>Click to edit Master text styles</a:t>
+              <a:t>Click to edit Master </a:t>
+            </a:r>
+            <a:r>
+              <a:rPr b="0" lang="en-US" sz="2800" spc="-1" strike="noStrike">
+                <a:solidFill>
+                  <a:schemeClr val="dk1"/>
+                </a:solidFill>
+                <a:latin typeface="Lato"/>
+                <a:ea typeface="Lato"/>
+              </a:rPr>
+              <a:t>text styles</a:t>
             </a:r>
             <a:endParaRPr b="0" lang="en-US" sz="2800" spc="-1" strike="noStrike">
               <a:solidFill>
@@ -6969,7 +7069,7 @@
               </a:lnSpc>
               <a:buNone/>
             </a:pPr>
-            <a:fld id="{67A70F1B-914F-4277-8DA2-1A829A709D12}" type="slidenum">
+            <a:fld id="{4D7DBEE9-3489-488E-9381-20ADA70BE4D3}" type="slidenum">
               <a:rPr b="1" lang="en-US" sz="1200" spc="-1" strike="noStrike">
                 <a:solidFill>
                   <a:srgbClr val="c00000"/>
@@ -7398,7 +7498,47 @@
                 <a:latin typeface="Lato"/>
                 <a:ea typeface="Lato"/>
               </a:rPr>
-              <a:t>Title 2: ………………………………………</a:t>
+              <a:t>Title 2: </a:t>
+            </a:r>
+            <a:r>
+              <a:rPr b="1" lang="en-US" sz="2800" spc="-1" strike="noStrike">
+                <a:solidFill>
+                  <a:schemeClr val="lt1"/>
+                </a:solidFill>
+                <a:latin typeface="Lato"/>
+                <a:ea typeface="Lato"/>
+              </a:rPr>
+              <a:t>…………</a:t>
+            </a:r>
+            <a:r>
+              <a:rPr b="1" lang="en-US" sz="2800" spc="-1" strike="noStrike">
+                <a:solidFill>
+                  <a:schemeClr val="lt1"/>
+                </a:solidFill>
+                <a:latin typeface="Lato"/>
+                <a:ea typeface="Lato"/>
+              </a:rPr>
+              <a:t>…………</a:t>
+            </a:r>
+            <a:r>
+              <a:rPr b="1" lang="en-US" sz="2800" spc="-1" strike="noStrike">
+                <a:solidFill>
+                  <a:schemeClr val="lt1"/>
+                </a:solidFill>
+                <a:latin typeface="Lato"/>
+                <a:ea typeface="Lato"/>
+              </a:rPr>
+              <a:t>…………</a:t>
+            </a:r>
+            <a:r>
+              <a:rPr b="1" lang="en-US" sz="2800" spc="-1" strike="noStrike">
+                <a:solidFill>
+                  <a:schemeClr val="lt1"/>
+                </a:solidFill>
+                <a:latin typeface="Lato"/>
+                <a:ea typeface="Lato"/>
+              </a:rPr>
+              <a:t>………</a:t>
             </a:r>
             <a:endParaRPr b="0" lang="en-US" sz="2800" spc="-1" strike="noStrike">
               <a:solidFill>
@@ -7704,7 +7844,7 @@
         <p:txBody>
           <a:bodyPr/>
           <a:p>
-            <a:fld id="{506FCF21-F9D9-419D-AAF8-5635C60657E2}" type="slidenum">
+            <a:fld id="{24475400-7745-4F19-B302-EC195C4DEA0C}" type="slidenum">
               <a:t>10</a:t>
             </a:fld>
           </a:p>
@@ -8048,7 +8188,7 @@
         <p:txBody>
           <a:bodyPr/>
           <a:p>
-            <a:fld id="{55837D84-D68B-4A52-92E9-AF04EF859B9E}" type="slidenum">
+            <a:fld id="{E80301FB-6C6D-4CA2-8BCD-5E6DC00E6115}" type="slidenum">
               <a:t>11</a:t>
             </a:fld>
           </a:p>
@@ -8231,7 +8371,7 @@
         <p:txBody>
           <a:bodyPr/>
           <a:p>
-            <a:fld id="{A21DF0B3-A89C-4158-BABA-4632725B4827}" type="slidenum">
+            <a:fld id="{1A1D5E36-4B3C-4F3E-B116-E7146EBFB096}" type="slidenum">
               <a:t>12</a:t>
             </a:fld>
           </a:p>
@@ -8422,7 +8562,7 @@
         <p:txBody>
           <a:bodyPr/>
           <a:p>
-            <a:fld id="{D84092BA-EBA6-4FDA-9531-CA5F699FE2E1}" type="slidenum">
+            <a:fld id="{22995076-99C7-44F3-A8E2-E301C09641A9}" type="slidenum">
               <a:t>13</a:t>
             </a:fld>
           </a:p>
@@ -8656,7 +8796,7 @@
         <p:txBody>
           <a:bodyPr/>
           <a:p>
-            <a:fld id="{2CE29361-FAFA-403E-BF9C-9ED8A140338E}" type="slidenum">
+            <a:fld id="{55BA0BD5-BF18-470F-9889-4E7C10FD1612}" type="slidenum">
               <a:t>14</a:t>
             </a:fld>
           </a:p>
@@ -8907,7 +9047,7 @@
         <p:txBody>
           <a:bodyPr/>
           <a:p>
-            <a:fld id="{C8A7B895-404E-44EE-A18B-7C3B62FA4E48}" type="slidenum">
+            <a:fld id="{38FD95BD-2511-4469-8B22-FE9EDEE06038}" type="slidenum">
               <a:t>15</a:t>
             </a:fld>
           </a:p>
@@ -9105,7 +9245,7 @@
         <p:txBody>
           <a:bodyPr/>
           <a:p>
-            <a:fld id="{57504C22-2D0F-4876-A166-87E3F9B4CFF8}" type="slidenum">
+            <a:fld id="{57635E5E-732C-4FE3-8A8A-4D753E585D47}" type="slidenum">
               <a:t>16</a:t>
             </a:fld>
           </a:p>
@@ -9276,6 +9416,38 @@
                 <a:latin typeface="Calibri"/>
                 <a:hlinkClick r:id="rId2"/>
               </a:rPr>
+              <a:t>https://viblo.asia/p/gioi-thieu-ve-reinforcement-learning-rl-djeZ1GEY5Wz</a:t>
+            </a:r>
+            <a:endParaRPr b="0" lang="en-US" sz="1800" spc="-1" strike="noStrike">
+              <a:solidFill>
+                <a:schemeClr val="dk1"/>
+              </a:solidFill>
+              <a:latin typeface="Calibri"/>
+            </a:endParaRPr>
+          </a:p>
+          <a:p>
+            <a:pPr marL="432000" indent="-324000">
+              <a:lnSpc>
+                <a:spcPct val="90000"/>
+              </a:lnSpc>
+              <a:spcBef>
+                <a:spcPts val="1417"/>
+              </a:spcBef>
+              <a:buClr>
+                <a:srgbClr val="000000"/>
+              </a:buClr>
+              <a:buSzPct val="45000"/>
+              <a:buFont typeface="Wingdings" charset="2"/>
+              <a:buChar char=""/>
+            </a:pPr>
+            <a:r>
+              <a:rPr b="0" lang="en-US" sz="1800" spc="-1" strike="noStrike">
+                <a:solidFill>
+                  <a:schemeClr val="dk1"/>
+                </a:solidFill>
+                <a:latin typeface="Calibri"/>
+                <a:hlinkClick r:id="rId3"/>
+              </a:rPr>
               <a:t>https://fdc.nal.usda.gov/fdc-app.html</a:t>
             </a:r>
             <a:endParaRPr b="0" lang="en-US" sz="1800" spc="-1" strike="noStrike">
@@ -9318,7 +9490,7 @@
         <p:txBody>
           <a:bodyPr/>
           <a:p>
-            <a:fld id="{53459E12-B906-4231-B679-B73F31E2FC0F}" type="slidenum">
+            <a:fld id="{500436BA-A164-4CF3-93D9-8A03CB79E9D2}" type="slidenum">
               <a:t>17</a:t>
             </a:fld>
           </a:p>
@@ -9422,7 +9594,7 @@
         <p:txBody>
           <a:bodyPr/>
           <a:p>
-            <a:fld id="{DAED04E8-145F-45B8-A837-FBB038A6E184}" type="slidenum">
+            <a:fld id="{7CA418F6-32DD-41E0-BACD-799A62816800}" type="slidenum">
               <a:t>18</a:t>
             </a:fld>
           </a:p>
@@ -9847,7 +10019,7 @@
         <p:txBody>
           <a:bodyPr/>
           <a:p>
-            <a:fld id="{A01C32A3-B22F-41E0-9ECE-A917FD9A2F44}" type="slidenum">
+            <a:fld id="{A2FCC413-ADC9-43BF-B845-FB9FBBB5DFC0}" type="slidenum">
               <a:t>3</a:t>
             </a:fld>
           </a:p>
@@ -9932,7 +10104,7 @@
               </a:lnSpc>
               <a:buNone/>
             </a:pPr>
-            <a:fld id="{E5B21B52-3B67-40AD-A3C1-BE4A98532750}" type="slidenum">
+            <a:fld id="{550AB695-FE46-4FF2-B662-D15CD5820987}" type="slidenum">
               <a:rPr b="1" lang="en-US" sz="1200" spc="-1" strike="noStrike">
                 <a:solidFill>
                   <a:srgbClr val="c00000"/>
@@ -10908,7 +11080,7 @@
         <p:txBody>
           <a:bodyPr/>
           <a:p>
-            <a:fld id="{D1D7ECB6-24F4-4992-9FB3-2CF01C2B8872}" type="slidenum">
+            <a:fld id="{FC6C1552-11AF-482E-BE1B-93771341BA0A}" type="slidenum">
               <a:t>5</a:t>
             </a:fld>
           </a:p>
@@ -12424,7 +12596,7 @@
         <p:txBody>
           <a:bodyPr/>
           <a:p>
-            <a:fld id="{55D22F0C-D5B9-4987-AD6A-78AE85B4E547}" type="slidenum">
+            <a:fld id="{7CCB654B-FE75-4522-9E30-071705568AFB}" type="slidenum">
               <a:t>6</a:t>
             </a:fld>
           </a:p>
@@ -12694,7 +12866,7 @@
         <p:txBody>
           <a:bodyPr/>
           <a:p>
-            <a:fld id="{77F99C97-2015-46E3-81C1-DE17BC71ABFD}" type="slidenum">
+            <a:fld id="{425F1942-9243-4EE5-9DF2-57DF52308F98}" type="slidenum">
               <a:t>7</a:t>
             </a:fld>
           </a:p>
@@ -12969,7 +13141,7 @@
         <p:txBody>
           <a:bodyPr/>
           <a:p>
-            <a:fld id="{B3F7B712-6DF7-448B-825C-0979EB3ED774}" type="slidenum">
+            <a:fld id="{E8976D8B-D1A8-47D1-8C54-A5E394E7C223}" type="slidenum">
               <a:t>8</a:t>
             </a:fld>
           </a:p>
@@ -13632,7 +13804,7 @@
         <p:txBody>
           <a:bodyPr/>
           <a:p>
-            <a:fld id="{DE9B84F3-0E27-4E5C-89CE-1E884DCAE94F}" type="slidenum">
+            <a:fld id="{612888A8-2862-4BFF-9C1B-54C272301540}" type="slidenum">
               <a:t>9</a:t>
             </a:fld>
           </a:p>

</xml_diff>